<commit_message>
Réduction du texte et correction de bug graphique dans le powerpoint sur solocal
</commit_message>
<xml_diff>
--- a/cv tableau_synthese pp/Entreprise-Solocal.pptx
+++ b/cv tableau_synthese pp/Entreprise-Solocal.pptx
@@ -121,12 +121,115 @@
 </p:presentation>
 </file>
 
-<file path=ppt/revisionInfo.xml><?xml version="1.0" encoding="utf-8"?>
-<p1510:revInfo xmlns:a="http://schemas.openxmlformats.org/drawingml/2006/main" xmlns:r="http://schemas.openxmlformats.org/officeDocument/2006/relationships" xmlns:p1510="http://schemas.microsoft.com/office/powerpoint/2015/10/main">
-  <p1510:revLst>
-    <p1510:client id="{8234750F-B669-4564-8EBC-43310861400E}" v="50" dt="2024-09-17T18:12:36.177"/>
-  </p1510:revLst>
-</p1510:revInfo>
+<file path=ppt/changesInfos/changesInfo1.xml><?xml version="1.0" encoding="utf-8"?>
+<pc:chgInfo xmlns:a="http://schemas.openxmlformats.org/drawingml/2006/main" xmlns:r="http://schemas.openxmlformats.org/officeDocument/2006/relationships" xmlns:ac="http://schemas.microsoft.com/office/drawing/2013/main/command" xmlns:pc="http://schemas.microsoft.com/office/powerpoint/2013/main/command">
+  <pc:docChgLst>
+    <pc:chgData name="Aaron EDERY" userId="bd275329-4fa0-405f-a92f-e8ac036c3002" providerId="ADAL" clId="{F1657A5F-D258-42CE-AB96-E449992F88B7}"/>
+    <pc:docChg chg="undo custSel addSld delSld modSld">
+      <pc:chgData name="Aaron EDERY" userId="bd275329-4fa0-405f-a92f-e8ac036c3002" providerId="ADAL" clId="{F1657A5F-D258-42CE-AB96-E449992F88B7}" dt="2025-03-26T13:54:44.305" v="103" actId="20577"/>
+      <pc:docMkLst>
+        <pc:docMk/>
+      </pc:docMkLst>
+      <pc:sldChg chg="addSp delSp mod">
+        <pc:chgData name="Aaron EDERY" userId="bd275329-4fa0-405f-a92f-e8ac036c3002" providerId="ADAL" clId="{F1657A5F-D258-42CE-AB96-E449992F88B7}" dt="2025-03-26T13:49:54.611" v="3" actId="22"/>
+        <pc:sldMkLst>
+          <pc:docMk/>
+          <pc:sldMk cId="4232626577" sldId="259"/>
+        </pc:sldMkLst>
+        <pc:picChg chg="add del">
+          <ac:chgData name="Aaron EDERY" userId="bd275329-4fa0-405f-a92f-e8ac036c3002" providerId="ADAL" clId="{F1657A5F-D258-42CE-AB96-E449992F88B7}" dt="2025-03-26T13:49:54.611" v="3" actId="22"/>
+          <ac:picMkLst>
+            <pc:docMk/>
+            <pc:sldMk cId="4232626577" sldId="259"/>
+            <ac:picMk id="5" creationId="{F3C8C295-DDC4-7F37-B4B1-73CF08189223}"/>
+          </ac:picMkLst>
+        </pc:picChg>
+      </pc:sldChg>
+      <pc:sldChg chg="add del">
+        <pc:chgData name="Aaron EDERY" userId="bd275329-4fa0-405f-a92f-e8ac036c3002" providerId="ADAL" clId="{F1657A5F-D258-42CE-AB96-E449992F88B7}" dt="2025-03-26T13:49:52.324" v="1" actId="47"/>
+        <pc:sldMkLst>
+          <pc:docMk/>
+          <pc:sldMk cId="1773218451" sldId="260"/>
+        </pc:sldMkLst>
+      </pc:sldChg>
+      <pc:sldChg chg="add del">
+        <pc:chgData name="Aaron EDERY" userId="bd275329-4fa0-405f-a92f-e8ac036c3002" providerId="ADAL" clId="{F1657A5F-D258-42CE-AB96-E449992F88B7}" dt="2025-03-26T13:51:44.151" v="16" actId="47"/>
+        <pc:sldMkLst>
+          <pc:docMk/>
+          <pc:sldMk cId="3624008592" sldId="261"/>
+        </pc:sldMkLst>
+      </pc:sldChg>
+      <pc:sldChg chg="modSp mod">
+        <pc:chgData name="Aaron EDERY" userId="bd275329-4fa0-405f-a92f-e8ac036c3002" providerId="ADAL" clId="{F1657A5F-D258-42CE-AB96-E449992F88B7}" dt="2025-03-26T13:54:44.305" v="103" actId="20577"/>
+        <pc:sldMkLst>
+          <pc:docMk/>
+          <pc:sldMk cId="618853909" sldId="264"/>
+        </pc:sldMkLst>
+        <pc:spChg chg="mod">
+          <ac:chgData name="Aaron EDERY" userId="bd275329-4fa0-405f-a92f-e8ac036c3002" providerId="ADAL" clId="{F1657A5F-D258-42CE-AB96-E449992F88B7}" dt="2025-03-26T13:54:44.305" v="103" actId="20577"/>
+          <ac:spMkLst>
+            <pc:docMk/>
+            <pc:sldMk cId="618853909" sldId="264"/>
+            <ac:spMk id="2" creationId="{EDD6772B-0CF5-DB0E-B3A7-3E4001DAFA85}"/>
+          </ac:spMkLst>
+        </pc:spChg>
+      </pc:sldChg>
+      <pc:sldChg chg="modSp add del mod">
+        <pc:chgData name="Aaron EDERY" userId="bd275329-4fa0-405f-a92f-e8ac036c3002" providerId="ADAL" clId="{F1657A5F-D258-42CE-AB96-E449992F88B7}" dt="2025-03-26T13:54:00.967" v="92" actId="20577"/>
+        <pc:sldMkLst>
+          <pc:docMk/>
+          <pc:sldMk cId="2529043700" sldId="265"/>
+        </pc:sldMkLst>
+        <pc:spChg chg="mod">
+          <ac:chgData name="Aaron EDERY" userId="bd275329-4fa0-405f-a92f-e8ac036c3002" providerId="ADAL" clId="{F1657A5F-D258-42CE-AB96-E449992F88B7}" dt="2025-03-26T13:54:00.967" v="92" actId="20577"/>
+          <ac:spMkLst>
+            <pc:docMk/>
+            <pc:sldMk cId="2529043700" sldId="265"/>
+            <ac:spMk id="2" creationId="{D858827D-094E-EF73-CF28-F8257F324A48}"/>
+          </ac:spMkLst>
+        </pc:spChg>
+      </pc:sldChg>
+      <pc:sldChg chg="addSp delSp modSp new del mod">
+        <pc:chgData name="Aaron EDERY" userId="bd275329-4fa0-405f-a92f-e8ac036c3002" providerId="ADAL" clId="{F1657A5F-D258-42CE-AB96-E449992F88B7}" dt="2025-03-26T13:51:45.129" v="27" actId="680"/>
+        <pc:sldMkLst>
+          <pc:docMk/>
+          <pc:sldMk cId="2314453785" sldId="266"/>
+        </pc:sldMkLst>
+        <pc:spChg chg="add del">
+          <ac:chgData name="Aaron EDERY" userId="bd275329-4fa0-405f-a92f-e8ac036c3002" providerId="ADAL" clId="{F1657A5F-D258-42CE-AB96-E449992F88B7}" dt="2025-03-26T13:51:45.075" v="26" actId="22"/>
+          <ac:spMkLst>
+            <pc:docMk/>
+            <pc:sldMk cId="2314453785" sldId="266"/>
+            <ac:spMk id="3" creationId="{A498BA63-0A49-27EC-AA88-787E710DA7EE}"/>
+          </ac:spMkLst>
+        </pc:spChg>
+        <pc:picChg chg="add del mod ord">
+          <ac:chgData name="Aaron EDERY" userId="bd275329-4fa0-405f-a92f-e8ac036c3002" providerId="ADAL" clId="{F1657A5F-D258-42CE-AB96-E449992F88B7}" dt="2025-03-26T13:51:45.075" v="26" actId="22"/>
+          <ac:picMkLst>
+            <pc:docMk/>
+            <pc:sldMk cId="2314453785" sldId="266"/>
+            <ac:picMk id="5" creationId="{69D5D491-0D61-C228-F46C-E75A17F09FE5}"/>
+          </ac:picMkLst>
+        </pc:picChg>
+      </pc:sldChg>
+      <pc:sldChg chg="addSp delSp modSp new del mod">
+        <pc:chgData name="Aaron EDERY" userId="bd275329-4fa0-405f-a92f-e8ac036c3002" providerId="ADAL" clId="{F1657A5F-D258-42CE-AB96-E449992F88B7}" dt="2025-03-26T13:51:44.759" v="20" actId="680"/>
+        <pc:sldMkLst>
+          <pc:docMk/>
+          <pc:sldMk cId="3282216749" sldId="267"/>
+        </pc:sldMkLst>
+        <pc:picChg chg="add del mod">
+          <ac:chgData name="Aaron EDERY" userId="bd275329-4fa0-405f-a92f-e8ac036c3002" providerId="ADAL" clId="{F1657A5F-D258-42CE-AB96-E449992F88B7}" dt="2025-03-26T13:51:44.718" v="19" actId="22"/>
+          <ac:picMkLst>
+            <pc:docMk/>
+            <pc:sldMk cId="3282216749" sldId="267"/>
+            <ac:picMk id="5" creationId="{A8440EA8-9B75-0096-5AC5-DA9B8D856DB4}"/>
+          </ac:picMkLst>
+        </pc:picChg>
+      </pc:sldChg>
+    </pc:docChg>
+  </pc:docChgLst>
+</pc:chgInfo>
 </file>
 
 <file path=ppt/diagrams/colors1.xml><?xml version="1.0" encoding="utf-8"?>
@@ -8704,7 +8807,7 @@
           <a:p>
             <a:fld id="{FBAE508D-4EEF-4646-9890-6F544A1A280D}" type="datetimeFigureOut">
               <a:rPr lang="fr-FR" smtClean="0"/>
-              <a:t>01/11/2024</a:t>
+              <a:t>26/03/2025</a:t>
             </a:fld>
             <a:endParaRPr lang="fr-FR"/>
           </a:p>
@@ -8902,7 +9005,7 @@
           <a:p>
             <a:fld id="{FBAE508D-4EEF-4646-9890-6F544A1A280D}" type="datetimeFigureOut">
               <a:rPr lang="fr-FR" smtClean="0"/>
-              <a:t>01/11/2024</a:t>
+              <a:t>26/03/2025</a:t>
             </a:fld>
             <a:endParaRPr lang="fr-FR"/>
           </a:p>
@@ -9110,7 +9213,7 @@
           <a:p>
             <a:fld id="{FBAE508D-4EEF-4646-9890-6F544A1A280D}" type="datetimeFigureOut">
               <a:rPr lang="fr-FR" smtClean="0"/>
-              <a:t>01/11/2024</a:t>
+              <a:t>26/03/2025</a:t>
             </a:fld>
             <a:endParaRPr lang="fr-FR"/>
           </a:p>
@@ -9308,7 +9411,7 @@
           <a:p>
             <a:fld id="{FBAE508D-4EEF-4646-9890-6F544A1A280D}" type="datetimeFigureOut">
               <a:rPr lang="fr-FR" smtClean="0"/>
-              <a:t>01/11/2024</a:t>
+              <a:t>26/03/2025</a:t>
             </a:fld>
             <a:endParaRPr lang="fr-FR"/>
           </a:p>
@@ -9583,7 +9686,7 @@
           <a:p>
             <a:fld id="{FBAE508D-4EEF-4646-9890-6F544A1A280D}" type="datetimeFigureOut">
               <a:rPr lang="fr-FR" smtClean="0"/>
-              <a:t>01/11/2024</a:t>
+              <a:t>26/03/2025</a:t>
             </a:fld>
             <a:endParaRPr lang="fr-FR"/>
           </a:p>
@@ -9848,7 +9951,7 @@
           <a:p>
             <a:fld id="{FBAE508D-4EEF-4646-9890-6F544A1A280D}" type="datetimeFigureOut">
               <a:rPr lang="fr-FR" smtClean="0"/>
-              <a:t>01/11/2024</a:t>
+              <a:t>26/03/2025</a:t>
             </a:fld>
             <a:endParaRPr lang="fr-FR"/>
           </a:p>
@@ -10260,7 +10363,7 @@
           <a:p>
             <a:fld id="{FBAE508D-4EEF-4646-9890-6F544A1A280D}" type="datetimeFigureOut">
               <a:rPr lang="fr-FR" smtClean="0"/>
-              <a:t>01/11/2024</a:t>
+              <a:t>26/03/2025</a:t>
             </a:fld>
             <a:endParaRPr lang="fr-FR"/>
           </a:p>
@@ -10401,7 +10504,7 @@
           <a:p>
             <a:fld id="{FBAE508D-4EEF-4646-9890-6F544A1A280D}" type="datetimeFigureOut">
               <a:rPr lang="fr-FR" smtClean="0"/>
-              <a:t>01/11/2024</a:t>
+              <a:t>26/03/2025</a:t>
             </a:fld>
             <a:endParaRPr lang="fr-FR"/>
           </a:p>
@@ -10514,7 +10617,7 @@
           <a:p>
             <a:fld id="{FBAE508D-4EEF-4646-9890-6F544A1A280D}" type="datetimeFigureOut">
               <a:rPr lang="fr-FR" smtClean="0"/>
-              <a:t>01/11/2024</a:t>
+              <a:t>26/03/2025</a:t>
             </a:fld>
             <a:endParaRPr lang="fr-FR"/>
           </a:p>
@@ -10825,7 +10928,7 @@
           <a:p>
             <a:fld id="{FBAE508D-4EEF-4646-9890-6F544A1A280D}" type="datetimeFigureOut">
               <a:rPr lang="fr-FR" smtClean="0"/>
-              <a:t>01/11/2024</a:t>
+              <a:t>26/03/2025</a:t>
             </a:fld>
             <a:endParaRPr lang="fr-FR"/>
           </a:p>
@@ -11113,7 +11216,7 @@
           <a:p>
             <a:fld id="{FBAE508D-4EEF-4646-9890-6F544A1A280D}" type="datetimeFigureOut">
               <a:rPr lang="fr-FR" smtClean="0"/>
-              <a:t>01/11/2024</a:t>
+              <a:t>26/03/2025</a:t>
             </a:fld>
             <a:endParaRPr lang="fr-FR"/>
           </a:p>
@@ -11354,7 +11457,7 @@
           <a:p>
             <a:fld id="{FBAE508D-4EEF-4646-9890-6F544A1A280D}" type="datetimeFigureOut">
               <a:rPr lang="fr-FR" smtClean="0"/>
-              <a:t>01/11/2024</a:t>
+              <a:t>26/03/2025</a:t>
             </a:fld>
             <a:endParaRPr lang="fr-FR"/>
           </a:p>
@@ -17609,12 +17712,12 @@
           <a:lstStyle/>
           <a:p>
             <a:r>
-              <a:rPr lang="fr-FR" sz="3600">
+              <a:rPr lang="fr-FR" sz="3600" dirty="0">
                 <a:solidFill>
                   <a:schemeClr val="tx2"/>
                 </a:solidFill>
               </a:rPr>
-              <a:t>SWOT</a:t>
+              <a:t>SWOT (Forces, Faiblesses, Opportunités, Menaces)</a:t>
             </a:r>
           </a:p>
         </p:txBody>
@@ -20931,7 +21034,15 @@
           <a:p>
             <a:r>
               <a:rPr lang="fr-FR" dirty="0"/>
-              <a:t>RGPD</a:t>
+              <a:t>RGPD (Règlement Général de Protection </a:t>
+            </a:r>
+            <a:r>
+              <a:rPr lang="fr-FR"/>
+              <a:t>des Données</a:t>
+            </a:r>
+            <a:r>
+              <a:rPr lang="fr-FR" dirty="0"/>
+              <a:t>)</a:t>
             </a:r>
           </a:p>
         </p:txBody>

</xml_diff>